<commit_message>
Create create and run test file slide
</commit_message>
<xml_diff>
--- a/testing/testing_go.pptx
+++ b/testing/testing_go.pptx
@@ -6,6 +6,8 @@
   </p:sldMasterIdLst>
   <p:sldIdLst>
     <p:sldId id="256" r:id="rId2"/>
+    <p:sldId id="257" r:id="rId3"/>
+    <p:sldId id="258" r:id="rId4"/>
   </p:sldIdLst>
   <p:sldSz cx="12192000" cy="6858000"/>
   <p:notesSz cx="6858000" cy="9144000"/>
@@ -3456,6 +3458,207 @@
 </p:sld>
 </file>
 
+<file path=ppt/slides/slide2.xml><?xml version="1.0" encoding="utf-8"?>
+<p:sld xmlns:a="http://schemas.openxmlformats.org/drawingml/2006/main" xmlns:r="http://schemas.openxmlformats.org/officeDocument/2006/relationships" xmlns:p="http://schemas.openxmlformats.org/presentationml/2006/main">
+  <p:cSld>
+    <p:spTree>
+      <p:nvGrpSpPr>
+        <p:cNvPr id="1" name=""/>
+        <p:cNvGrpSpPr/>
+        <p:nvPr/>
+      </p:nvGrpSpPr>
+      <p:grpSpPr>
+        <a:xfrm>
+          <a:off x="0" y="0"/>
+          <a:ext cx="0" cy="0"/>
+          <a:chOff x="0" y="0"/>
+          <a:chExt cx="0" cy="0"/>
+        </a:xfrm>
+      </p:grpSpPr>
+      <p:sp>
+        <p:nvSpPr>
+          <p:cNvPr id="2" name="Title 1">
+            <a:extLst>
+              <a:ext uri="{FF2B5EF4-FFF2-40B4-BE49-F238E27FC236}">
+                <a16:creationId xmlns:a16="http://schemas.microsoft.com/office/drawing/2014/main" id="{0C44E768-F23C-478C-8A37-B840F9A19445}"/>
+              </a:ext>
+            </a:extLst>
+          </p:cNvPr>
+          <p:cNvSpPr>
+            <a:spLocks noGrp="1"/>
+          </p:cNvSpPr>
+          <p:nvPr>
+            <p:ph type="title"/>
+          </p:nvPr>
+        </p:nvSpPr>
+        <p:spPr/>
+        <p:txBody>
+          <a:bodyPr/>
+          <a:lstStyle/>
+          <a:p>
+            <a:r>
+              <a:rPr lang="en-US" dirty="0"/>
+              <a:t>Create &amp; Run Test File</a:t>
+            </a:r>
+          </a:p>
+        </p:txBody>
+      </p:sp>
+      <p:sp>
+        <p:nvSpPr>
+          <p:cNvPr id="3" name="Content Placeholder 2">
+            <a:extLst>
+              <a:ext uri="{FF2B5EF4-FFF2-40B4-BE49-F238E27FC236}">
+                <a16:creationId xmlns:a16="http://schemas.microsoft.com/office/drawing/2014/main" id="{4289EC33-9C28-48DC-AE74-16BFD636BEB5}"/>
+              </a:ext>
+            </a:extLst>
+          </p:cNvPr>
+          <p:cNvSpPr>
+            <a:spLocks noGrp="1"/>
+          </p:cNvSpPr>
+          <p:nvPr>
+            <p:ph idx="1"/>
+          </p:nvPr>
+        </p:nvSpPr>
+        <p:spPr/>
+        <p:txBody>
+          <a:bodyPr/>
+          <a:lstStyle/>
+          <a:p>
+            <a:r>
+              <a:rPr lang="en-US" dirty="0"/>
+              <a:t>To create a test, create a file named *_</a:t>
+            </a:r>
+            <a:r>
+              <a:rPr lang="en-US" dirty="0" err="1"/>
+              <a:t>test.go</a:t>
+            </a:r>
+            <a:endParaRPr lang="en-US" dirty="0"/>
+          </a:p>
+          <a:p>
+            <a:r>
+              <a:rPr lang="en-US" dirty="0"/>
+              <a:t>To run all the tests in a package type “go test”</a:t>
+            </a:r>
+          </a:p>
+        </p:txBody>
+      </p:sp>
+    </p:spTree>
+    <p:extLst>
+      <p:ext uri="{BB962C8B-B14F-4D97-AF65-F5344CB8AC3E}">
+        <p14:creationId xmlns:p14="http://schemas.microsoft.com/office/powerpoint/2010/main" val="33560826"/>
+      </p:ext>
+    </p:extLst>
+  </p:cSld>
+  <p:clrMapOvr>
+    <a:masterClrMapping/>
+  </p:clrMapOvr>
+</p:sld>
+</file>
+
+<file path=ppt/slides/slide3.xml><?xml version="1.0" encoding="utf-8"?>
+<p:sld xmlns:a="http://schemas.openxmlformats.org/drawingml/2006/main" xmlns:r="http://schemas.openxmlformats.org/officeDocument/2006/relationships" xmlns:p="http://schemas.openxmlformats.org/presentationml/2006/main">
+  <p:cSld>
+    <p:spTree>
+      <p:nvGrpSpPr>
+        <p:cNvPr id="1" name=""/>
+        <p:cNvGrpSpPr/>
+        <p:nvPr/>
+      </p:nvGrpSpPr>
+      <p:grpSpPr>
+        <a:xfrm>
+          <a:off x="0" y="0"/>
+          <a:ext cx="0" cy="0"/>
+          <a:chOff x="0" y="0"/>
+          <a:chExt cx="0" cy="0"/>
+        </a:xfrm>
+      </p:grpSpPr>
+      <p:sp>
+        <p:nvSpPr>
+          <p:cNvPr id="2" name="Title 1">
+            <a:extLst>
+              <a:ext uri="{FF2B5EF4-FFF2-40B4-BE49-F238E27FC236}">
+                <a16:creationId xmlns:a16="http://schemas.microsoft.com/office/drawing/2014/main" id="{21789915-8AC2-4FB5-B16C-450770656C7D}"/>
+              </a:ext>
+            </a:extLst>
+          </p:cNvPr>
+          <p:cNvSpPr>
+            <a:spLocks noGrp="1"/>
+          </p:cNvSpPr>
+          <p:nvPr>
+            <p:ph type="title"/>
+          </p:nvPr>
+        </p:nvSpPr>
+        <p:spPr/>
+        <p:txBody>
+          <a:bodyPr/>
+          <a:lstStyle/>
+          <a:p>
+            <a:r>
+              <a:rPr lang="en-US" dirty="0"/>
+              <a:t>Test Cases </a:t>
+            </a:r>
+          </a:p>
+        </p:txBody>
+      </p:sp>
+      <p:sp>
+        <p:nvSpPr>
+          <p:cNvPr id="3" name="Content Placeholder 2">
+            <a:extLst>
+              <a:ext uri="{FF2B5EF4-FFF2-40B4-BE49-F238E27FC236}">
+                <a16:creationId xmlns:a16="http://schemas.microsoft.com/office/drawing/2014/main" id="{5398AD73-FFD8-4429-B108-E0863BB2BE3C}"/>
+              </a:ext>
+            </a:extLst>
+          </p:cNvPr>
+          <p:cNvSpPr>
+            <a:spLocks noGrp="1"/>
+          </p:cNvSpPr>
+          <p:nvPr>
+            <p:ph idx="1"/>
+          </p:nvPr>
+        </p:nvSpPr>
+        <p:spPr/>
+        <p:txBody>
+          <a:bodyPr/>
+          <a:lstStyle/>
+          <a:p>
+            <a:r>
+              <a:rPr lang="en-US" dirty="0"/>
+              <a:t>Make sure created deck has the correct number of cards.</a:t>
+            </a:r>
+          </a:p>
+          <a:p>
+            <a:pPr lvl="1"/>
+            <a:r>
+              <a:rPr lang="en-US" dirty="0"/>
+              <a:t>Write if statement to see if the deck has the right number of cards</a:t>
+            </a:r>
+          </a:p>
+          <a:p>
+            <a:pPr lvl="1"/>
+            <a:r>
+              <a:rPr lang="en-US" dirty="0"/>
+              <a:t>If not then test go test handler that something </a:t>
+            </a:r>
+            <a:r>
+              <a:rPr lang="en-US"/>
+              <a:t>is wrong.</a:t>
+            </a:r>
+          </a:p>
+        </p:txBody>
+      </p:sp>
+    </p:spTree>
+    <p:extLst>
+      <p:ext uri="{BB962C8B-B14F-4D97-AF65-F5344CB8AC3E}">
+        <p14:creationId xmlns:p14="http://schemas.microsoft.com/office/powerpoint/2010/main" val="980094496"/>
+      </p:ext>
+    </p:extLst>
+  </p:cSld>
+  <p:clrMapOvr>
+    <a:masterClrMapping/>
+  </p:clrMapOvr>
+</p:sld>
+</file>
+
 <file path=ppt/theme/theme1.xml><?xml version="1.0" encoding="utf-8"?>
 <a:theme xmlns:a="http://schemas.openxmlformats.org/drawingml/2006/main" name="Frame">
   <a:themeElements>

</xml_diff>

<commit_message>
add test cases in powerpoint
</commit_message>
<xml_diff>
--- a/testing/testing_go.pptx
+++ b/testing/testing_go.pptx
@@ -8,6 +8,7 @@
     <p:sldId id="256" r:id="rId2"/>
     <p:sldId id="257" r:id="rId3"/>
     <p:sldId id="258" r:id="rId4"/>
+    <p:sldId id="259" r:id="rId5"/>
   </p:sldIdLst>
   <p:sldSz cx="12192000" cy="6858000"/>
   <p:notesSz cx="6858000" cy="9144000"/>
@@ -106,6 +107,11 @@
       </a:defRPr>
     </a:lvl9pPr>
   </p:defaultTextStyle>
+  <p:extLst>
+    <p:ext uri="{EFAFB233-063F-42B5-8137-9DF3F51BA10A}">
+      <p15:sldGuideLst xmlns:p15="http://schemas.microsoft.com/office/powerpoint/2012/main"/>
+    </p:ext>
+  </p:extLst>
 </p:presentation>
 </file>
 
@@ -334,7 +340,7 @@
             <a:fld id="{5586B75A-687E-405C-8A0B-8D00578BA2C3}" type="datetimeFigureOut">
               <a:rPr lang="en-US" dirty="0"/>
               <a:pPr/>
-              <a:t>6/30/2019</a:t>
+              <a:t>7/1/2019</a:t>
             </a:fld>
             <a:endParaRPr lang="en-US" dirty="0"/>
           </a:p>
@@ -501,7 +507,7 @@
             <a:fld id="{5586B75A-687E-405C-8A0B-8D00578BA2C3}" type="datetimeFigureOut">
               <a:rPr lang="en-US" dirty="0"/>
               <a:pPr/>
-              <a:t>6/30/2019</a:t>
+              <a:t>7/1/2019</a:t>
             </a:fld>
             <a:endParaRPr lang="en-US" dirty="0"/>
           </a:p>
@@ -678,7 +684,7 @@
             <a:fld id="{5586B75A-687E-405C-8A0B-8D00578BA2C3}" type="datetimeFigureOut">
               <a:rPr lang="en-US" dirty="0"/>
               <a:pPr/>
-              <a:t>6/30/2019</a:t>
+              <a:t>7/1/2019</a:t>
             </a:fld>
             <a:endParaRPr lang="en-US" dirty="0"/>
           </a:p>
@@ -845,7 +851,7 @@
             <a:fld id="{5586B75A-687E-405C-8A0B-8D00578BA2C3}" type="datetimeFigureOut">
               <a:rPr lang="en-US" dirty="0"/>
               <a:pPr/>
-              <a:t>6/30/2019</a:t>
+              <a:t>7/1/2019</a:t>
             </a:fld>
             <a:endParaRPr lang="en-US" dirty="0"/>
           </a:p>
@@ -1100,7 +1106,7 @@
             <a:fld id="{5586B75A-687E-405C-8A0B-8D00578BA2C3}" type="datetimeFigureOut">
               <a:rPr lang="en-US" dirty="0"/>
               <a:pPr/>
-              <a:t>6/30/2019</a:t>
+              <a:t>7/1/2019</a:t>
             </a:fld>
             <a:endParaRPr lang="en-US" dirty="0"/>
           </a:p>
@@ -1385,7 +1391,7 @@
             <a:fld id="{5586B75A-687E-405C-8A0B-8D00578BA2C3}" type="datetimeFigureOut">
               <a:rPr lang="en-US" dirty="0"/>
               <a:pPr/>
-              <a:t>6/30/2019</a:t>
+              <a:t>7/1/2019</a:t>
             </a:fld>
             <a:endParaRPr lang="en-US" dirty="0"/>
           </a:p>
@@ -1824,7 +1830,7 @@
             <a:fld id="{5586B75A-687E-405C-8A0B-8D00578BA2C3}" type="datetimeFigureOut">
               <a:rPr lang="en-US" dirty="0"/>
               <a:pPr/>
-              <a:t>6/30/2019</a:t>
+              <a:t>7/1/2019</a:t>
             </a:fld>
             <a:endParaRPr lang="en-US" dirty="0"/>
           </a:p>
@@ -1939,7 +1945,7 @@
             <a:fld id="{5586B75A-687E-405C-8A0B-8D00578BA2C3}" type="datetimeFigureOut">
               <a:rPr lang="en-US" dirty="0"/>
               <a:pPr/>
-              <a:t>6/30/2019</a:t>
+              <a:t>7/1/2019</a:t>
             </a:fld>
             <a:endParaRPr lang="en-US" dirty="0"/>
           </a:p>
@@ -2031,7 +2037,7 @@
             <a:fld id="{5586B75A-687E-405C-8A0B-8D00578BA2C3}" type="datetimeFigureOut">
               <a:rPr lang="en-US" dirty="0"/>
               <a:pPr/>
-              <a:t>6/30/2019</a:t>
+              <a:t>7/1/2019</a:t>
             </a:fld>
             <a:endParaRPr lang="en-US" dirty="0"/>
           </a:p>
@@ -2316,7 +2322,7 @@
             <a:fld id="{5586B75A-687E-405C-8A0B-8D00578BA2C3}" type="datetimeFigureOut">
               <a:rPr lang="en-US" dirty="0"/>
               <a:pPr/>
-              <a:t>6/30/2019</a:t>
+              <a:t>7/1/2019</a:t>
             </a:fld>
             <a:endParaRPr lang="en-US" dirty="0"/>
           </a:p>
@@ -2586,7 +2592,7 @@
             <a:fld id="{5586B75A-687E-405C-8A0B-8D00578BA2C3}" type="datetimeFigureOut">
               <a:rPr lang="en-US" dirty="0"/>
               <a:pPr/>
-              <a:t>6/30/2019</a:t>
+              <a:t>7/1/2019</a:t>
             </a:fld>
             <a:endParaRPr lang="en-US" dirty="0"/>
           </a:p>
@@ -2880,7 +2886,7 @@
             <a:fld id="{5586B75A-687E-405C-8A0B-8D00578BA2C3}" type="datetimeFigureOut">
               <a:rPr lang="en-US" dirty="0"/>
               <a:pPr/>
-              <a:t>6/30/2019</a:t>
+              <a:t>7/1/2019</a:t>
             </a:fld>
             <a:endParaRPr lang="en-US" dirty="0"/>
           </a:p>
@@ -3637,11 +3643,19 @@
             <a:pPr lvl="1"/>
             <a:r>
               <a:rPr lang="en-US" dirty="0"/>
-              <a:t>If not then test go test handler that something </a:t>
-            </a:r>
-            <a:r>
-              <a:rPr lang="en-US"/>
-              <a:t>is wrong.</a:t>
+              <a:t>If not then tell go test handler that something is wrong.</a:t>
+            </a:r>
+          </a:p>
+          <a:p>
+            <a:r>
+              <a:rPr lang="en-US" dirty="0"/>
+              <a:t>Make sure first card is Ace of Spades</a:t>
+            </a:r>
+          </a:p>
+          <a:p>
+            <a:r>
+              <a:rPr lang="en-US"/>
+              <a:t>Make sure last card is </a:t>
             </a:r>
           </a:p>
         </p:txBody>
@@ -3650,6 +3664,86 @@
     <p:extLst>
       <p:ext uri="{BB962C8B-B14F-4D97-AF65-F5344CB8AC3E}">
         <p14:creationId xmlns:p14="http://schemas.microsoft.com/office/powerpoint/2010/main" val="980094496"/>
+      </p:ext>
+    </p:extLst>
+  </p:cSld>
+  <p:clrMapOvr>
+    <a:masterClrMapping/>
+  </p:clrMapOvr>
+</p:sld>
+</file>
+
+<file path=ppt/slides/slide4.xml><?xml version="1.0" encoding="utf-8"?>
+<p:sld xmlns:a="http://schemas.openxmlformats.org/drawingml/2006/main" xmlns:r="http://schemas.openxmlformats.org/officeDocument/2006/relationships" xmlns:p="http://schemas.openxmlformats.org/presentationml/2006/main">
+  <p:cSld>
+    <p:spTree>
+      <p:nvGrpSpPr>
+        <p:cNvPr id="1" name=""/>
+        <p:cNvGrpSpPr/>
+        <p:nvPr/>
+      </p:nvGrpSpPr>
+      <p:grpSpPr>
+        <a:xfrm>
+          <a:off x="0" y="0"/>
+          <a:ext cx="0" cy="0"/>
+          <a:chOff x="0" y="0"/>
+          <a:chExt cx="0" cy="0"/>
+        </a:xfrm>
+      </p:grpSpPr>
+      <p:sp>
+        <p:nvSpPr>
+          <p:cNvPr id="2" name="Title 1">
+            <a:extLst>
+              <a:ext uri="{FF2B5EF4-FFF2-40B4-BE49-F238E27FC236}">
+                <a16:creationId xmlns:a16="http://schemas.microsoft.com/office/drawing/2014/main" id="{D5BAEC84-122F-4620-BA5B-FA0515C602CA}"/>
+              </a:ext>
+            </a:extLst>
+          </p:cNvPr>
+          <p:cNvSpPr>
+            <a:spLocks noGrp="1"/>
+          </p:cNvSpPr>
+          <p:nvPr>
+            <p:ph type="title"/>
+          </p:nvPr>
+        </p:nvSpPr>
+        <p:spPr/>
+        <p:txBody>
+          <a:bodyPr/>
+          <a:lstStyle/>
+          <a:p>
+            <a:endParaRPr lang="en-US"/>
+          </a:p>
+        </p:txBody>
+      </p:sp>
+      <p:sp>
+        <p:nvSpPr>
+          <p:cNvPr id="3" name="Content Placeholder 2">
+            <a:extLst>
+              <a:ext uri="{FF2B5EF4-FFF2-40B4-BE49-F238E27FC236}">
+                <a16:creationId xmlns:a16="http://schemas.microsoft.com/office/drawing/2014/main" id="{D9A0FB74-A7CD-49EB-B517-B10B522A3935}"/>
+              </a:ext>
+            </a:extLst>
+          </p:cNvPr>
+          <p:cNvSpPr>
+            <a:spLocks noGrp="1"/>
+          </p:cNvSpPr>
+          <p:nvPr>
+            <p:ph idx="1"/>
+          </p:nvPr>
+        </p:nvSpPr>
+        <p:spPr/>
+        <p:txBody>
+          <a:bodyPr/>
+          <a:lstStyle/>
+          <a:p>
+            <a:endParaRPr lang="en-US"/>
+          </a:p>
+        </p:txBody>
+      </p:sp>
+    </p:spTree>
+    <p:extLst>
+      <p:ext uri="{BB962C8B-B14F-4D97-AF65-F5344CB8AC3E}">
+        <p14:creationId xmlns:p14="http://schemas.microsoft.com/office/powerpoint/2010/main" val="1397155167"/>
       </p:ext>
     </p:extLst>
   </p:cSld>

</xml_diff>

<commit_message>
create initial deck_test.go file
</commit_message>
<xml_diff>
--- a/testing/testing_go.pptx
+++ b/testing/testing_go.pptx
@@ -3649,14 +3649,19 @@
           <a:p>
             <a:r>
               <a:rPr lang="en-US" dirty="0"/>
-              <a:t>Make sure first card is Ace of Spades</a:t>
-            </a:r>
-          </a:p>
-          <a:p>
-            <a:r>
-              <a:rPr lang="en-US"/>
-              <a:t>Make sure last card is </a:t>
-            </a:r>
+              <a:t>Make sure first card is Ace of Hearts</a:t>
+            </a:r>
+          </a:p>
+          <a:p>
+            <a:r>
+              <a:rPr lang="en-US" dirty="0"/>
+              <a:t>Make sure last card </a:t>
+            </a:r>
+            <a:r>
+              <a:rPr lang="en-US"/>
+              <a:t>is King of Diamonds</a:t>
+            </a:r>
+            <a:endParaRPr lang="en-US" dirty="0"/>
           </a:p>
         </p:txBody>
       </p:sp>

</xml_diff>

<commit_message>
complete slide for test video
</commit_message>
<xml_diff>
--- a/testing/testing_go.pptx
+++ b/testing/testing_go.pptx
@@ -8,7 +8,6 @@
     <p:sldId id="256" r:id="rId2"/>
     <p:sldId id="257" r:id="rId3"/>
     <p:sldId id="258" r:id="rId4"/>
-    <p:sldId id="259" r:id="rId5"/>
   </p:sldIdLst>
   <p:sldSz cx="12192000" cy="6858000"/>
   <p:notesSz cx="6858000" cy="9144000"/>
@@ -3655,13 +3654,8 @@
           <a:p>
             <a:r>
               <a:rPr lang="en-US" dirty="0"/>
-              <a:t>Make sure last card </a:t>
-            </a:r>
-            <a:r>
-              <a:rPr lang="en-US"/>
-              <a:t>is King of Diamonds</a:t>
-            </a:r>
-            <a:endParaRPr lang="en-US" dirty="0"/>
+              <a:t>Make sure last card is King of Diamonds</a:t>
+            </a:r>
           </a:p>
         </p:txBody>
       </p:sp>
@@ -3669,86 +3663,6 @@
     <p:extLst>
       <p:ext uri="{BB962C8B-B14F-4D97-AF65-F5344CB8AC3E}">
         <p14:creationId xmlns:p14="http://schemas.microsoft.com/office/powerpoint/2010/main" val="980094496"/>
-      </p:ext>
-    </p:extLst>
-  </p:cSld>
-  <p:clrMapOvr>
-    <a:masterClrMapping/>
-  </p:clrMapOvr>
-</p:sld>
-</file>
-
-<file path=ppt/slides/slide4.xml><?xml version="1.0" encoding="utf-8"?>
-<p:sld xmlns:a="http://schemas.openxmlformats.org/drawingml/2006/main" xmlns:r="http://schemas.openxmlformats.org/officeDocument/2006/relationships" xmlns:p="http://schemas.openxmlformats.org/presentationml/2006/main">
-  <p:cSld>
-    <p:spTree>
-      <p:nvGrpSpPr>
-        <p:cNvPr id="1" name=""/>
-        <p:cNvGrpSpPr/>
-        <p:nvPr/>
-      </p:nvGrpSpPr>
-      <p:grpSpPr>
-        <a:xfrm>
-          <a:off x="0" y="0"/>
-          <a:ext cx="0" cy="0"/>
-          <a:chOff x="0" y="0"/>
-          <a:chExt cx="0" cy="0"/>
-        </a:xfrm>
-      </p:grpSpPr>
-      <p:sp>
-        <p:nvSpPr>
-          <p:cNvPr id="2" name="Title 1">
-            <a:extLst>
-              <a:ext uri="{FF2B5EF4-FFF2-40B4-BE49-F238E27FC236}">
-                <a16:creationId xmlns:a16="http://schemas.microsoft.com/office/drawing/2014/main" id="{D5BAEC84-122F-4620-BA5B-FA0515C602CA}"/>
-              </a:ext>
-            </a:extLst>
-          </p:cNvPr>
-          <p:cNvSpPr>
-            <a:spLocks noGrp="1"/>
-          </p:cNvSpPr>
-          <p:nvPr>
-            <p:ph type="title"/>
-          </p:nvPr>
-        </p:nvSpPr>
-        <p:spPr/>
-        <p:txBody>
-          <a:bodyPr/>
-          <a:lstStyle/>
-          <a:p>
-            <a:endParaRPr lang="en-US"/>
-          </a:p>
-        </p:txBody>
-      </p:sp>
-      <p:sp>
-        <p:nvSpPr>
-          <p:cNvPr id="3" name="Content Placeholder 2">
-            <a:extLst>
-              <a:ext uri="{FF2B5EF4-FFF2-40B4-BE49-F238E27FC236}">
-                <a16:creationId xmlns:a16="http://schemas.microsoft.com/office/drawing/2014/main" id="{D9A0FB74-A7CD-49EB-B517-B10B522A3935}"/>
-              </a:ext>
-            </a:extLst>
-          </p:cNvPr>
-          <p:cNvSpPr>
-            <a:spLocks noGrp="1"/>
-          </p:cNvSpPr>
-          <p:nvPr>
-            <p:ph idx="1"/>
-          </p:nvPr>
-        </p:nvSpPr>
-        <p:spPr/>
-        <p:txBody>
-          <a:bodyPr/>
-          <a:lstStyle/>
-          <a:p>
-            <a:endParaRPr lang="en-US"/>
-          </a:p>
-        </p:txBody>
-      </p:sp>
-    </p:spTree>
-    <p:extLst>
-      <p:ext uri="{BB962C8B-B14F-4D97-AF65-F5344CB8AC3E}">
-        <p14:creationId xmlns:p14="http://schemas.microsoft.com/office/powerpoint/2010/main" val="1397155167"/>
       </p:ext>
     </p:extLst>
   </p:cSld>

</xml_diff>